<commit_message>
Agregar referencias, formato y beneficios de propuesta
</commit_message>
<xml_diff>
--- a/Problema medioambiental.pptx
+++ b/Problema medioambiental.pptx
@@ -7474,13 +7474,22 @@
               <a:buNone/>
             </a:pPr>
             <a:r>
+              <a:rPr lang="pt-BR" sz="1800" dirty="0" err="1">
+                <a:latin typeface="Lato"/>
+                <a:ea typeface="Lato"/>
+                <a:cs typeface="Lato"/>
+                <a:sym typeface="Lato"/>
+              </a:rPr>
+              <a:t>Ángel</a:t>
+            </a:r>
+            <a:r>
               <a:rPr lang="pt-BR" sz="1800" dirty="0">
                 <a:latin typeface="Lato"/>
                 <a:ea typeface="Lato"/>
                 <a:cs typeface="Lato"/>
                 <a:sym typeface="Lato"/>
               </a:rPr>
-              <a:t>Angel David </a:t>
+              <a:t> David </a:t>
             </a:r>
             <a:r>
               <a:rPr lang="pt-BR" sz="1800" dirty="0" err="1">
@@ -7986,7 +7995,7 @@
             </a:r>
           </a:p>
           <a:p>
-            <a:pPr marL="457200" lvl="0" indent="-342900" algn="just" rtl="0">
+            <a:pPr lvl="0" algn="just" rtl="0">
               <a:spcBef>
                 <a:spcPts val="1200"/>
               </a:spcBef>
@@ -7994,7 +8003,8 @@
                 <a:spcPts val="0"/>
               </a:spcAft>
               <a:buSzPts val="1800"/>
-              <a:buChar char="●"/>
+              <a:buFont typeface="Wingdings" panose="05000000000000000000" pitchFamily="2" charset="2"/>
+              <a:buChar char="§"/>
             </a:pPr>
             <a:r>
               <a:rPr lang="es-ES" sz="1400" dirty="0">
@@ -8009,7 +8019,7 @@
             </a:r>
           </a:p>
           <a:p>
-            <a:pPr marL="457200" lvl="0" indent="-342900" algn="just" rtl="0">
+            <a:pPr lvl="0" algn="just" rtl="0">
               <a:spcBef>
                 <a:spcPts val="0"/>
               </a:spcBef>
@@ -8017,7 +8027,8 @@
                 <a:spcPts val="0"/>
               </a:spcAft>
               <a:buSzPts val="1800"/>
-              <a:buChar char="●"/>
+              <a:buFont typeface="Wingdings" panose="05000000000000000000" pitchFamily="2" charset="2"/>
+              <a:buChar char="§"/>
             </a:pPr>
             <a:r>
               <a:rPr lang="es-ES" sz="1400" dirty="0">
@@ -8032,7 +8043,7 @@
             </a:r>
           </a:p>
           <a:p>
-            <a:pPr marL="457200" lvl="0" indent="-342900" algn="just" rtl="0">
+            <a:pPr lvl="0" algn="just" rtl="0">
               <a:spcBef>
                 <a:spcPts val="0"/>
               </a:spcBef>
@@ -8040,7 +8051,8 @@
                 <a:spcPts val="0"/>
               </a:spcAft>
               <a:buSzPts val="1800"/>
-              <a:buChar char="●"/>
+              <a:buFont typeface="Wingdings" panose="05000000000000000000" pitchFamily="2" charset="2"/>
+              <a:buChar char="§"/>
             </a:pPr>
             <a:r>
               <a:rPr lang="es-ES" sz="1400" dirty="0">
@@ -8055,7 +8067,7 @@
             </a:r>
           </a:p>
           <a:p>
-            <a:pPr marL="457200" lvl="0" indent="-342900" algn="just" rtl="0">
+            <a:pPr lvl="0" algn="just" rtl="0">
               <a:spcBef>
                 <a:spcPts val="0"/>
               </a:spcBef>
@@ -8063,7 +8075,8 @@
                 <a:spcPts val="0"/>
               </a:spcAft>
               <a:buSzPts val="1800"/>
-              <a:buChar char="●"/>
+              <a:buFont typeface="Wingdings" panose="05000000000000000000" pitchFamily="2" charset="2"/>
+              <a:buChar char="§"/>
             </a:pPr>
             <a:r>
               <a:rPr lang="es-ES" sz="1400" dirty="0">
@@ -8078,7 +8091,7 @@
             </a:r>
           </a:p>
           <a:p>
-            <a:pPr marL="457200" lvl="0" indent="-342900" algn="just" rtl="0">
+            <a:pPr lvl="0" algn="just" rtl="0">
               <a:spcBef>
                 <a:spcPts val="0"/>
               </a:spcBef>
@@ -8086,7 +8099,8 @@
                 <a:spcPts val="0"/>
               </a:spcAft>
               <a:buSzPts val="1800"/>
-              <a:buChar char="●"/>
+              <a:buFont typeface="Wingdings" panose="05000000000000000000" pitchFamily="2" charset="2"/>
+              <a:buChar char="§"/>
             </a:pPr>
             <a:r>
               <a:rPr lang="es-ES" sz="1400" dirty="0" err="1">
@@ -10348,7 +10362,26 @@
               <a:rPr lang="es-MX" dirty="0">
                 <a:latin typeface="Proxima Nova" panose="020B0604020202020204" charset="0"/>
               </a:rPr>
-              <a:t>También ayuda a comprender los estados de la tierra en diferentes estaciones del año, como se adapta a diferentes temperaturas para que así los encargados de ella puedan apropiar este sistema a estas mediciones e interpretaciones</a:t>
+              <a:t>También ayuda a comprender los estados de la tierra en diferentes estaciones del año, como se adapta a diferentes temperaturas para que así los encargados de ella puedan apropiar este sistema a estas mediciones e interpretaciones.</a:t>
+            </a:r>
+          </a:p>
+          <a:p>
+            <a:pPr marL="114300" indent="0" algn="just">
+              <a:buNone/>
+            </a:pPr>
+            <a:endParaRPr lang="es-MX" dirty="0">
+              <a:latin typeface="Proxima Nova" panose="020B0604020202020204" charset="0"/>
+            </a:endParaRPr>
+          </a:p>
+          <a:p>
+            <a:pPr marL="114300" indent="0" algn="just">
+              <a:buNone/>
+            </a:pPr>
+            <a:r>
+              <a:rPr lang="es-MX" dirty="0">
+                <a:latin typeface="Proxima Nova" panose="020B0604020202020204" charset="0"/>
+              </a:rPr>
+              <a:t>Estos sensores podrían mejorar y evitar el mayor uso de suelo fértil si se evita una degradación constante, ya que cuando un suelo ya no estaba nutrido lo suficiente buscaban otro espacio, repitiendo el proceso. Con es te proyecto se puede llevar a un alongamiento del uso de un solo suelo y evitar mayores problemáticas</a:t>
             </a:r>
           </a:p>
           <a:p>

</xml_diff>